<commit_message>
add genfunclinrec-homogeneous.pptx adn inhom; edit other genfunc
</commit_message>
<xml_diff>
--- a/spring13/slides13/genfunccoefficient.pptx
+++ b/spring13/slides13/genfunccoefficient.pptx
@@ -5,10 +5,10 @@
     <p:sldMasterId id="2147483650" r:id="rId1"/>
   </p:sldMasterIdLst>
   <p:notesMasterIdLst>
-    <p:notesMasterId r:id="rId12"/>
+    <p:notesMasterId r:id="rId13"/>
   </p:notesMasterIdLst>
   <p:handoutMasterIdLst>
-    <p:handoutMasterId r:id="rId13"/>
+    <p:handoutMasterId r:id="rId14"/>
   </p:handoutMasterIdLst>
   <p:sldIdLst>
     <p:sldId id="474" r:id="rId2"/>
@@ -21,11 +21,12 @@
     <p:sldId id="577" r:id="rId9"/>
     <p:sldId id="526" r:id="rId10"/>
     <p:sldId id="576" r:id="rId11"/>
+    <p:sldId id="578" r:id="rId12"/>
   </p:sldIdLst>
   <p:sldSz cx="9144000" cy="6858000" type="screen4x3"/>
   <p:notesSz cx="9601200" cy="7315200"/>
   <p:custDataLst>
-    <p:tags r:id="rId15"/>
+    <p:tags r:id="rId16"/>
   </p:custDataLst>
   <p:defaultTextStyle>
     <a:defPPr>
@@ -1028,6 +1029,93 @@
 </p:notes>
 </file>
 
+<file path=ppt/notesSlides/notesSlide11.xml><?xml version="1.0" encoding="utf-8"?>
+<p:notes xmlns:a="http://schemas.openxmlformats.org/drawingml/2006/main" xmlns:r="http://schemas.openxmlformats.org/officeDocument/2006/relationships" xmlns:p="http://schemas.openxmlformats.org/presentationml/2006/main">
+  <p:cSld>
+    <p:spTree>
+      <p:nvGrpSpPr>
+        <p:cNvPr id="1" name=""/>
+        <p:cNvGrpSpPr/>
+        <p:nvPr/>
+      </p:nvGrpSpPr>
+      <p:grpSpPr>
+        <a:xfrm>
+          <a:off x="0" y="0"/>
+          <a:ext cx="0" cy="0"/>
+          <a:chOff x="0" y="0"/>
+          <a:chExt cx="0" cy="0"/>
+        </a:xfrm>
+      </p:grpSpPr>
+      <p:sp>
+        <p:nvSpPr>
+          <p:cNvPr id="2" name="Slide Image Placeholder 1"/>
+          <p:cNvSpPr>
+            <a:spLocks noGrp="1" noRot="1" noChangeAspect="1"/>
+          </p:cNvSpPr>
+          <p:nvPr>
+            <p:ph type="sldImg"/>
+          </p:nvPr>
+        </p:nvSpPr>
+        <p:spPr/>
+      </p:sp>
+      <p:sp>
+        <p:nvSpPr>
+          <p:cNvPr id="3" name="Notes Placeholder 2"/>
+          <p:cNvSpPr>
+            <a:spLocks noGrp="1"/>
+          </p:cNvSpPr>
+          <p:nvPr>
+            <p:ph type="body" idx="1"/>
+          </p:nvPr>
+        </p:nvSpPr>
+        <p:spPr/>
+        <p:txBody>
+          <a:bodyPr>
+            <a:normAutofit/>
+          </a:bodyPr>
+          <a:lstStyle/>
+          <a:p>
+            <a:endParaRPr lang="en-US"/>
+          </a:p>
+        </p:txBody>
+      </p:sp>
+      <p:sp>
+        <p:nvSpPr>
+          <p:cNvPr id="4" name="Slide Number Placeholder 3"/>
+          <p:cNvSpPr>
+            <a:spLocks noGrp="1"/>
+          </p:cNvSpPr>
+          <p:nvPr>
+            <p:ph type="sldNum" sz="quarter" idx="10"/>
+          </p:nvPr>
+        </p:nvSpPr>
+        <p:spPr/>
+        <p:txBody>
+          <a:bodyPr/>
+          <a:lstStyle/>
+          <a:p>
+            <a:pPr>
+              <a:defRPr/>
+            </a:pPr>
+            <a:fld id="{E7625D05-B33F-4064-AC10-CB80748B6ABD}" type="slidenum">
+              <a:rPr lang="en-US" smtClean="0"/>
+              <a:pPr>
+                <a:defRPr/>
+              </a:pPr>
+              <a:t>11</a:t>
+            </a:fld>
+            <a:endParaRPr lang="en-US"/>
+          </a:p>
+        </p:txBody>
+      </p:sp>
+    </p:spTree>
+  </p:cSld>
+  <p:clrMapOvr>
+    <a:masterClrMapping/>
+  </p:clrMapOvr>
+</p:notes>
+</file>
+
 <file path=ppt/notesSlides/notesSlide2.xml><?xml version="1.0" encoding="utf-8"?>
 <p:notes xmlns:a="http://schemas.openxmlformats.org/drawingml/2006/main" xmlns:r="http://schemas.openxmlformats.org/officeDocument/2006/relationships" xmlns:p="http://schemas.openxmlformats.org/presentationml/2006/main">
   <p:cSld>
@@ -1878,6 +1966,9 @@
   <p:clrMapOvr>
     <a:masterClrMapping/>
   </p:clrMapOvr>
+  <p:transition xmlns:p14="http://schemas.microsoft.com/office/powerpoint/2010/main" spd="slow" advClick="0">
+    <p:fade/>
+  </p:transition>
   <p:timing>
     <p:tnLst>
       <p:par>
@@ -2024,6 +2115,9 @@
   <p:clrMapOvr>
     <a:masterClrMapping/>
   </p:clrMapOvr>
+  <p:transition xmlns:p14="http://schemas.microsoft.com/office/powerpoint/2010/main" spd="slow" advClick="0">
+    <p:fade/>
+  </p:transition>
   <p:timing>
     <p:tnLst>
       <p:par>
@@ -2118,6 +2212,9 @@
   <p:clrMapOvr>
     <a:masterClrMapping/>
   </p:clrMapOvr>
+  <p:transition xmlns:p14="http://schemas.microsoft.com/office/powerpoint/2010/main" spd="slow" advClick="0">
+    <p:fade/>
+  </p:transition>
   <p:timing>
     <p:tnLst>
       <p:par>
@@ -2189,6 +2286,9 @@
   <p:clrMapOvr>
     <a:masterClrMapping/>
   </p:clrMapOvr>
+  <p:transition xmlns:p14="http://schemas.microsoft.com/office/powerpoint/2010/main" spd="slow" advClick="0">
+    <p:fade/>
+  </p:transition>
   <p:timing>
     <p:tnLst>
       <p:par>
@@ -2419,6 +2519,9 @@
   <p:clrMapOvr>
     <a:masterClrMapping/>
   </p:clrMapOvr>
+  <p:transition xmlns:p14="http://schemas.microsoft.com/office/powerpoint/2010/main" spd="slow" advClick="0">
+    <p:fade/>
+  </p:transition>
   <p:timing>
     <p:tnLst>
       <p:par>
@@ -2758,6 +2861,9 @@
     <p:sldLayoutId id="2147483657" r:id="rId4"/>
     <p:sldLayoutId id="2147483659" r:id="rId5"/>
   </p:sldLayoutIdLst>
+  <p:transition xmlns:p14="http://schemas.microsoft.com/office/powerpoint/2010/main" spd="slow" advClick="0">
+    <p:fade/>
+  </p:transition>
   <p:timing>
     <p:tnLst>
       <p:par>
@@ -3317,7 +3423,26 @@
                   <a:schemeClr val="tx2"/>
                 </a:solidFill>
               </a:rPr>
-              <a:t>Coefficients by Counting</a:t>
+              <a:t>Coefficients</a:t>
+            </a:r>
+          </a:p>
+          <a:p>
+            <a:pPr algn="ctr"/>
+            <a:r>
+              <a:rPr lang="en-US" sz="6000" b="1" dirty="0" smtClean="0">
+                <a:solidFill>
+                  <a:schemeClr val="tx2"/>
+                </a:solidFill>
+              </a:rPr>
+              <a:t>by </a:t>
+            </a:r>
+            <a:r>
+              <a:rPr lang="en-US" sz="6000" b="1" dirty="0" smtClean="0">
+                <a:solidFill>
+                  <a:schemeClr val="tx2"/>
+                </a:solidFill>
+              </a:rPr>
+              <a:t>Counting</a:t>
             </a:r>
             <a:endParaRPr lang="en-US" sz="1200" b="1" dirty="0">
               <a:solidFill>
@@ -3332,10 +3457,102 @@
   <p:clrMapOvr>
     <a:masterClrMapping/>
   </p:clrMapOvr>
+  <mc:AlternateContent xmlns:mc="http://schemas.openxmlformats.org/markup-compatibility/2006">
+    <mc:Choice xmlns:p14="http://schemas.microsoft.com/office/powerpoint/2010/main" Requires="p14">
+      <p:transition p14:dur="0" advClick="0"/>
+    </mc:Choice>
+    <mc:Fallback>
+      <p:transition xmlns:p14="http://schemas.microsoft.com/office/powerpoint/2010/main" advClick="0"/>
+    </mc:Fallback>
+  </mc:AlternateContent>
   <p:timing>
     <p:tnLst>
       <p:par>
-        <p:cTn xmlns:p14="http://schemas.microsoft.com/office/powerpoint/2010/main" id="1" dur="indefinite" restart="never" nodeType="tmRoot"/>
+        <p:cTn xmlns:p14="http://schemas.microsoft.com/office/powerpoint/2010/main" id="1" dur="indefinite" restart="never" nodeType="tmRoot">
+          <p:childTnLst>
+            <p:seq concurrent="1" nextAc="seek">
+              <p:cTn id="2" dur="indefinite" nodeType="mainSeq">
+                <p:childTnLst>
+                  <p:par>
+                    <p:cTn id="3" fill="hold">
+                      <p:stCondLst>
+                        <p:cond delay="indefinite"/>
+                      </p:stCondLst>
+                      <p:childTnLst>
+                        <p:par>
+                          <p:cTn id="4" fill="hold">
+                            <p:stCondLst>
+                              <p:cond delay="0"/>
+                            </p:stCondLst>
+                            <p:childTnLst>
+                              <p:par>
+                                <p:cTn id="5" presetID="10" presetClass="entr" presetSubtype="0" fill="hold" nodeType="clickEffect">
+                                  <p:stCondLst>
+                                    <p:cond delay="0"/>
+                                  </p:stCondLst>
+                                  <p:childTnLst>
+                                    <p:set>
+                                      <p:cBhvr>
+                                        <p:cTn id="6" dur="1" fill="hold">
+                                          <p:stCondLst>
+                                            <p:cond delay="0"/>
+                                          </p:stCondLst>
+                                        </p:cTn>
+                                        <p:tgtEl>
+                                          <p:spTgt spid="8196">
+                                            <p:txEl>
+                                              <p:pRg st="2" end="2"/>
+                                            </p:txEl>
+                                          </p:spTgt>
+                                        </p:tgtEl>
+                                        <p:attrNameLst>
+                                          <p:attrName>style.visibility</p:attrName>
+                                        </p:attrNameLst>
+                                      </p:cBhvr>
+                                      <p:to>
+                                        <p:strVal val="visible"/>
+                                      </p:to>
+                                    </p:set>
+                                    <p:animEffect transition="in" filter="fade">
+                                      <p:cBhvr>
+                                        <p:cTn id="7" dur="500"/>
+                                        <p:tgtEl>
+                                          <p:spTgt spid="8196">
+                                            <p:txEl>
+                                              <p:pRg st="2" end="2"/>
+                                            </p:txEl>
+                                          </p:spTgt>
+                                        </p:tgtEl>
+                                      </p:cBhvr>
+                                    </p:animEffect>
+                                  </p:childTnLst>
+                                </p:cTn>
+                              </p:par>
+                            </p:childTnLst>
+                          </p:cTn>
+                        </p:par>
+                      </p:childTnLst>
+                    </p:cTn>
+                  </p:par>
+                </p:childTnLst>
+              </p:cTn>
+              <p:prevCondLst>
+                <p:cond evt="onPrev" delay="0">
+                  <p:tgtEl>
+                    <p:sldTgt/>
+                  </p:tgtEl>
+                </p:cond>
+              </p:prevCondLst>
+              <p:nextCondLst>
+                <p:cond evt="onNext" delay="0">
+                  <p:tgtEl>
+                    <p:sldTgt/>
+                  </p:tgtEl>
+                </p:cond>
+              </p:nextCondLst>
+            </p:seq>
+          </p:childTnLst>
+        </p:cTn>
       </p:par>
     </p:tnLst>
   </p:timing>
@@ -3442,7 +3659,7 @@
           <a:graphicData uri="http://schemas.openxmlformats.org/presentationml/2006/ole">
             <mc:AlternateContent xmlns:mc="http://schemas.openxmlformats.org/markup-compatibility/2006">
               <mc:Choice xmlns:v="urn:schemas-microsoft-com:vml" Requires="v">
-                <p:oleObj spid="_x0000_s1065" name="Equation" r:id="rId4" imgW="3073400" imgH="1574800" progId="Equation.DSMT4">
+                <p:oleObj spid="_x0000_s1074" name="Equation" r:id="rId4" imgW="3073400" imgH="1574800" progId="Equation.DSMT4">
                   <p:embed/>
                 </p:oleObj>
               </mc:Choice>
@@ -3582,7 +3799,7 @@
           <a:graphicData uri="http://schemas.openxmlformats.org/presentationml/2006/ole">
             <mc:AlternateContent xmlns:mc="http://schemas.openxmlformats.org/markup-compatibility/2006">
               <mc:Choice xmlns:v="urn:schemas-microsoft-com:vml" Requires="v">
-                <p:oleObj spid="_x0000_s1066" name="Equation" r:id="rId6" imgW="2857500" imgH="1663700" progId="Equation.DSMT4">
+                <p:oleObj spid="_x0000_s1075" name="Equation" r:id="rId6" imgW="2857500" imgH="1663700" progId="Equation.DSMT4">
                   <p:embed/>
                 </p:oleObj>
               </mc:Choice>
@@ -3640,7 +3857,7 @@
   <p:clrMapOvr>
     <a:masterClrMapping/>
   </p:clrMapOvr>
-  <p:transition xmlns:p14="http://schemas.microsoft.com/office/powerpoint/2010/main" spd="slow">
+  <p:transition xmlns:p14="http://schemas.microsoft.com/office/powerpoint/2010/main" spd="slow" advClick="0">
     <p:fade thruBlk="1"/>
   </p:transition>
   <p:timing>
@@ -3729,6 +3946,377 @@
 </p:sld>
 </file>
 
+<file path=ppt/slides/slide11.xml><?xml version="1.0" encoding="utf-8"?>
+<p:sld xmlns:a="http://schemas.openxmlformats.org/drawingml/2006/main" xmlns:r="http://schemas.openxmlformats.org/officeDocument/2006/relationships" xmlns:p="http://schemas.openxmlformats.org/presentationml/2006/main">
+  <p:cSld>
+    <p:spTree>
+      <p:nvGrpSpPr>
+        <p:cNvPr id="1" name=""/>
+        <p:cNvGrpSpPr/>
+        <p:nvPr/>
+      </p:nvGrpSpPr>
+      <p:grpSpPr>
+        <a:xfrm>
+          <a:off x="0" y="0"/>
+          <a:ext cx="0" cy="0"/>
+          <a:chOff x="0" y="0"/>
+          <a:chExt cx="0" cy="0"/>
+        </a:xfrm>
+      </p:grpSpPr>
+      <p:sp>
+        <p:nvSpPr>
+          <p:cNvPr id="2" name="Title 1"/>
+          <p:cNvSpPr>
+            <a:spLocks noGrp="1"/>
+          </p:cNvSpPr>
+          <p:nvPr>
+            <p:ph type="title"/>
+          </p:nvPr>
+        </p:nvSpPr>
+        <p:spPr>
+          <a:xfrm>
+            <a:off x="1600200" y="228600"/>
+            <a:ext cx="7543800" cy="1143000"/>
+          </a:xfrm>
+        </p:spPr>
+        <p:txBody>
+          <a:bodyPr/>
+          <a:lstStyle/>
+          <a:p>
+            <a:r>
+              <a:rPr lang="en-US" dirty="0" smtClean="0"/>
+              <a:t>The Donut Number!</a:t>
+            </a:r>
+            <a:endParaRPr lang="en-US" dirty="0"/>
+          </a:p>
+        </p:txBody>
+      </p:sp>
+      <p:sp>
+        <p:nvSpPr>
+          <p:cNvPr id="3" name="Slide Number Placeholder 2"/>
+          <p:cNvSpPr>
+            <a:spLocks noGrp="1"/>
+          </p:cNvSpPr>
+          <p:nvPr>
+            <p:ph type="sldNum" sz="quarter" idx="10"/>
+          </p:nvPr>
+        </p:nvSpPr>
+        <p:spPr/>
+        <p:txBody>
+          <a:bodyPr/>
+          <a:lstStyle/>
+          <a:p>
+            <a:pPr>
+              <a:defRPr/>
+            </a:pPr>
+            <a:r>
+              <a:rPr lang="en-US" dirty="0" smtClean="0"/>
+              <a:t>coefficients.</a:t>
+            </a:r>
+            <a:fld id="{A585D087-0720-40C8-BCB9-442D95888E3B}" type="slidenum">
+              <a:rPr lang="en-US" smtClean="0"/>
+              <a:pPr>
+                <a:defRPr/>
+              </a:pPr>
+              <a:t>11</a:t>
+            </a:fld>
+            <a:endParaRPr lang="en-US" dirty="0"/>
+          </a:p>
+        </p:txBody>
+      </p:sp>
+      <p:graphicFrame>
+        <p:nvGraphicFramePr>
+          <p:cNvPr id="6" name="Object 5"/>
+          <p:cNvGraphicFramePr>
+            <a:graphicFrameLocks noChangeAspect="1"/>
+          </p:cNvGraphicFramePr>
+          <p:nvPr>
+            <p:extLst>
+              <p:ext uri="{D42A27DB-BD31-4B8C-83A1-F6EECF244321}">
+                <p14:modId xmlns:p14="http://schemas.microsoft.com/office/powerpoint/2010/main" val="2931462710"/>
+              </p:ext>
+            </p:extLst>
+          </p:nvPr>
+        </p:nvGraphicFramePr>
+        <p:xfrm>
+          <a:off x="4606466" y="2209800"/>
+          <a:ext cx="4308934" cy="1828800"/>
+        </p:xfrm>
+        <a:graphic>
+          <a:graphicData uri="http://schemas.openxmlformats.org/presentationml/2006/ole">
+            <mc:AlternateContent xmlns:mc="http://schemas.openxmlformats.org/markup-compatibility/2006">
+              <mc:Choice xmlns:v="urn:schemas-microsoft-com:vml" Requires="v">
+                <p:oleObj spid="_x0000_s259079" name="Equation" r:id="rId4" imgW="3708400" imgH="1574800" progId="Equation.DSMT4">
+                  <p:embed/>
+                </p:oleObj>
+              </mc:Choice>
+              <mc:Fallback>
+                <p:oleObj name="Equation" r:id="rId4" imgW="3708400" imgH="1574800" progId="Equation.DSMT4">
+                  <p:embed/>
+                  <p:pic>
+                    <p:nvPicPr>
+                      <p:cNvPr id="0" name=""/>
+                      <p:cNvPicPr>
+                        <a:picLocks noChangeAspect="1" noChangeArrowheads="1"/>
+                      </p:cNvPicPr>
+                      <p:nvPr/>
+                    </p:nvPicPr>
+                    <p:blipFill>
+                      <a:blip r:embed="rId5"/>
+                      <a:srcRect/>
+                      <a:stretch>
+                        <a:fillRect/>
+                      </a:stretch>
+                    </p:blipFill>
+                    <p:spPr bwMode="auto">
+                      <a:xfrm>
+                        <a:off x="4606466" y="2209800"/>
+                        <a:ext cx="4308934" cy="1828800"/>
+                      </a:xfrm>
+                      <a:prstGeom prst="rect">
+                        <a:avLst/>
+                      </a:prstGeom>
+                      <a:noFill/>
+                      <a:extLst/>
+                    </p:spPr>
+                  </p:pic>
+                </p:oleObj>
+              </mc:Fallback>
+            </mc:AlternateContent>
+          </a:graphicData>
+        </a:graphic>
+      </p:graphicFrame>
+      <p:graphicFrame>
+        <p:nvGraphicFramePr>
+          <p:cNvPr id="254979" name="Object 4"/>
+          <p:cNvGraphicFramePr>
+            <a:graphicFrameLocks noChangeAspect="1"/>
+          </p:cNvGraphicFramePr>
+          <p:nvPr>
+            <p:extLst>
+              <p:ext uri="{D42A27DB-BD31-4B8C-83A1-F6EECF244321}">
+                <p14:modId xmlns:p14="http://schemas.microsoft.com/office/powerpoint/2010/main" val="3382194832"/>
+              </p:ext>
+            </p:extLst>
+          </p:nvPr>
+        </p:nvGraphicFramePr>
+        <p:xfrm>
+          <a:off x="133244" y="2133600"/>
+          <a:ext cx="4390574" cy="1901059"/>
+        </p:xfrm>
+        <a:graphic>
+          <a:graphicData uri="http://schemas.openxmlformats.org/presentationml/2006/ole">
+            <mc:AlternateContent xmlns:mc="http://schemas.openxmlformats.org/markup-compatibility/2006">
+              <mc:Choice xmlns:v="urn:schemas-microsoft-com:vml" Requires="v">
+                <p:oleObj spid="_x0000_s259080" name="Equation" r:id="rId6" imgW="3416300" imgH="1638300" progId="Equation.DSMT4">
+                  <p:embed/>
+                </p:oleObj>
+              </mc:Choice>
+              <mc:Fallback>
+                <p:oleObj name="Equation" r:id="rId6" imgW="3416300" imgH="1638300" progId="Equation.DSMT4">
+                  <p:embed/>
+                  <p:pic>
+                    <p:nvPicPr>
+                      <p:cNvPr id="0" name=""/>
+                      <p:cNvPicPr>
+                        <a:picLocks noChangeAspect="1" noChangeArrowheads="1"/>
+                      </p:cNvPicPr>
+                      <p:nvPr/>
+                    </p:nvPicPr>
+                    <p:blipFill>
+                      <a:blip r:embed="rId7"/>
+                      <a:srcRect/>
+                      <a:stretch>
+                        <a:fillRect/>
+                      </a:stretch>
+                    </p:blipFill>
+                    <p:spPr bwMode="auto">
+                      <a:xfrm>
+                        <a:off x="133244" y="2133600"/>
+                        <a:ext cx="4390574" cy="1901059"/>
+                      </a:xfrm>
+                      <a:prstGeom prst="rect">
+                        <a:avLst/>
+                      </a:prstGeom>
+                      <a:noFill/>
+                      <a:extLst/>
+                    </p:spPr>
+                  </p:pic>
+                </p:oleObj>
+              </mc:Fallback>
+            </mc:AlternateContent>
+          </a:graphicData>
+        </a:graphic>
+      </p:graphicFrame>
+      <p:sp>
+        <p:nvSpPr>
+          <p:cNvPr id="5" name="Rectangle 4"/>
+          <p:cNvSpPr/>
+          <p:nvPr/>
+        </p:nvSpPr>
+        <p:spPr bwMode="auto">
+          <a:xfrm>
+            <a:off x="76200" y="1905000"/>
+            <a:ext cx="8991600" cy="2667000"/>
+          </a:xfrm>
+          <a:prstGeom prst="rect">
+            <a:avLst/>
+          </a:prstGeom>
+          <a:solidFill>
+            <a:schemeClr val="accent1">
+              <a:alpha val="0"/>
+            </a:schemeClr>
+          </a:solidFill>
+          <a:ln w="44450" cap="flat" cmpd="sng" algn="ctr">
+            <a:solidFill>
+              <a:srgbClr val="FF00FF"/>
+            </a:solidFill>
+            <a:prstDash val="sysDash"/>
+            <a:round/>
+            <a:headEnd type="none" w="med" len="med"/>
+            <a:tailEnd type="none" w="med" len="med"/>
+          </a:ln>
+          <a:effectLst/>
+        </p:spPr>
+        <p:txBody>
+          <a:bodyPr vert="horz" wrap="square" lIns="91440" tIns="45720" rIns="91440" bIns="45720" numCol="1" rtlCol="0" anchor="t" anchorCtr="0" compatLnSpc="1">
+            <a:prstTxWarp prst="textNoShape">
+              <a:avLst/>
+            </a:prstTxWarp>
+          </a:bodyPr>
+          <a:lstStyle/>
+          <a:p>
+            <a:pPr marL="0" marR="0" indent="0" algn="l" defTabSz="914400" rtl="0" eaLnBrk="1" fontAlgn="base" latinLnBrk="0" hangingPunct="1">
+              <a:lnSpc>
+                <a:spcPct val="100000"/>
+              </a:lnSpc>
+              <a:spcBef>
+                <a:spcPct val="0"/>
+              </a:spcBef>
+              <a:spcAft>
+                <a:spcPct val="0"/>
+              </a:spcAft>
+              <a:buClrTx/>
+              <a:buSzTx/>
+              <a:buFontTx/>
+              <a:buNone/>
+              <a:tabLst/>
+            </a:pPr>
+            <a:endParaRPr kumimoji="0" lang="en-US" sz="4400" b="0" i="0" u="none" strike="noStrike" cap="none" normalizeH="0" baseline="0" smtClean="0">
+              <a:ln>
+                <a:noFill/>
+              </a:ln>
+              <a:solidFill>
+                <a:schemeClr val="tx1"/>
+              </a:solidFill>
+              <a:effectLst/>
+              <a:latin typeface="Comic Sans MS" pitchFamily="66" charset="0"/>
+            </a:endParaRPr>
+          </a:p>
+        </p:txBody>
+      </p:sp>
+    </p:spTree>
+    <p:extLst>
+      <p:ext uri="{BB962C8B-B14F-4D97-AF65-F5344CB8AC3E}">
+        <p14:creationId xmlns:p14="http://schemas.microsoft.com/office/powerpoint/2010/main" val="2820956431"/>
+      </p:ext>
+    </p:extLst>
+  </p:cSld>
+  <p:clrMapOvr>
+    <a:masterClrMapping/>
+  </p:clrMapOvr>
+  <p:transition xmlns:p14="http://schemas.microsoft.com/office/powerpoint/2010/main" spd="slow" advClick="0">
+    <p:fade thruBlk="1"/>
+  </p:transition>
+  <p:timing>
+    <p:tnLst>
+      <p:par>
+        <p:cTn xmlns:p14="http://schemas.microsoft.com/office/powerpoint/2010/main" id="1" dur="indefinite" restart="never" nodeType="tmRoot">
+          <p:childTnLst>
+            <p:seq concurrent="1" nextAc="seek">
+              <p:cTn id="2" dur="indefinite" nodeType="mainSeq">
+                <p:childTnLst>
+                  <p:par>
+                    <p:cTn id="3" fill="hold">
+                      <p:stCondLst>
+                        <p:cond delay="indefinite"/>
+                      </p:stCondLst>
+                      <p:childTnLst>
+                        <p:par>
+                          <p:cTn id="4" fill="hold">
+                            <p:stCondLst>
+                              <p:cond delay="0"/>
+                            </p:stCondLst>
+                            <p:childTnLst>
+                              <p:par>
+                                <p:cTn id="5" presetID="10" presetClass="entr" presetSubtype="0" fill="hold" grpId="0" nodeType="clickEffect">
+                                  <p:stCondLst>
+                                    <p:cond delay="0"/>
+                                  </p:stCondLst>
+                                  <p:childTnLst>
+                                    <p:set>
+                                      <p:cBhvr>
+                                        <p:cTn id="6" dur="1" fill="hold">
+                                          <p:stCondLst>
+                                            <p:cond delay="0"/>
+                                          </p:stCondLst>
+                                        </p:cTn>
+                                        <p:tgtEl>
+                                          <p:spTgt spid="5"/>
+                                        </p:tgtEl>
+                                        <p:attrNameLst>
+                                          <p:attrName>style.visibility</p:attrName>
+                                        </p:attrNameLst>
+                                      </p:cBhvr>
+                                      <p:to>
+                                        <p:strVal val="visible"/>
+                                      </p:to>
+                                    </p:set>
+                                    <p:animEffect transition="in" filter="fade">
+                                      <p:cBhvr>
+                                        <p:cTn id="7" dur="500"/>
+                                        <p:tgtEl>
+                                          <p:spTgt spid="5"/>
+                                        </p:tgtEl>
+                                      </p:cBhvr>
+                                    </p:animEffect>
+                                  </p:childTnLst>
+                                </p:cTn>
+                              </p:par>
+                            </p:childTnLst>
+                          </p:cTn>
+                        </p:par>
+                      </p:childTnLst>
+                    </p:cTn>
+                  </p:par>
+                </p:childTnLst>
+              </p:cTn>
+              <p:prevCondLst>
+                <p:cond evt="onPrev" delay="0">
+                  <p:tgtEl>
+                    <p:sldTgt/>
+                  </p:tgtEl>
+                </p:cond>
+              </p:prevCondLst>
+              <p:nextCondLst>
+                <p:cond evt="onNext" delay="0">
+                  <p:tgtEl>
+                    <p:sldTgt/>
+                  </p:tgtEl>
+                </p:cond>
+              </p:nextCondLst>
+            </p:seq>
+          </p:childTnLst>
+        </p:cTn>
+      </p:par>
+    </p:tnLst>
+    <p:bldLst>
+      <p:bldP spid="5" grpId="0" animBg="1"/>
+    </p:bldLst>
+  </p:timing>
+</p:sld>
+</file>
+
 <file path=ppt/slides/slide2.xml><?xml version="1.0" encoding="utf-8"?>
 <p:sld xmlns:a="http://schemas.openxmlformats.org/drawingml/2006/main" xmlns:r="http://schemas.openxmlformats.org/officeDocument/2006/relationships" xmlns:p="http://schemas.openxmlformats.org/presentationml/2006/main">
   <p:cSld>
@@ -3768,7 +4356,15 @@
           <a:p>
             <a:r>
               <a:rPr lang="en-US" dirty="0" smtClean="0"/>
-              <a:t>A Familiar Generating Function?</a:t>
+              <a:t>Donut </a:t>
+            </a:r>
+            <a:r>
+              <a:rPr lang="en-US" dirty="0" smtClean="0"/>
+              <a:t>Generating </a:t>
+            </a:r>
+            <a:r>
+              <a:rPr lang="en-US" dirty="0" smtClean="0"/>
+              <a:t>Function</a:t>
             </a:r>
             <a:endParaRPr lang="en-US" dirty="0"/>
           </a:p>
@@ -3877,7 +4473,7 @@
           <a:graphicData uri="http://schemas.openxmlformats.org/presentationml/2006/ole">
             <mc:AlternateContent xmlns:mc="http://schemas.openxmlformats.org/markup-compatibility/2006">
               <mc:Choice xmlns:v="urn:schemas-microsoft-com:vml" Requires="v">
-                <p:oleObj spid="_x0000_s235569" name="Equation" r:id="rId4" imgW="3429000" imgH="1244520" progId="Equation.DSMT4">
+                <p:oleObj spid="_x0000_s235576" name="Equation" r:id="rId4" imgW="3429000" imgH="1244520" progId="Equation.DSMT4">
                   <p:embed/>
                 </p:oleObj>
               </mc:Choice>
@@ -3947,7 +4543,7 @@
           <a:graphicData uri="http://schemas.openxmlformats.org/presentationml/2006/ole">
             <mc:AlternateContent xmlns:mc="http://schemas.openxmlformats.org/markup-compatibility/2006">
               <mc:Choice xmlns:v="urn:schemas-microsoft-com:vml" Requires="v">
-                <p:oleObj spid="_x0000_s235570" name="Equation" r:id="rId6" imgW="3429000" imgH="1244520" progId="Equation.DSMT4">
+                <p:oleObj spid="_x0000_s235577" name="Equation" r:id="rId6" imgW="3429000" imgH="1244520" progId="Equation.DSMT4">
                   <p:embed/>
                 </p:oleObj>
               </mc:Choice>
@@ -4006,6 +4602,9 @@
   <p:clrMapOvr>
     <a:masterClrMapping/>
   </p:clrMapOvr>
+  <p:transition xmlns:p14="http://schemas.microsoft.com/office/powerpoint/2010/main" spd="slow" advClick="0">
+    <p:fade thruBlk="1"/>
+  </p:transition>
   <p:timing>
     <p:tnLst>
       <p:par>
@@ -4164,34 +4763,6 @@
       </p:grpSpPr>
       <p:sp>
         <p:nvSpPr>
-          <p:cNvPr id="2" name="Title 1"/>
-          <p:cNvSpPr>
-            <a:spLocks noGrp="1"/>
-          </p:cNvSpPr>
-          <p:nvPr>
-            <p:ph type="title"/>
-          </p:nvPr>
-        </p:nvSpPr>
-        <p:spPr>
-          <a:xfrm>
-            <a:off x="1600200" y="228600"/>
-            <a:ext cx="7543800" cy="1143000"/>
-          </a:xfrm>
-        </p:spPr>
-        <p:txBody>
-          <a:bodyPr/>
-          <a:lstStyle/>
-          <a:p>
-            <a:r>
-              <a:rPr lang="en-US" dirty="0" smtClean="0"/>
-              <a:t>A Familiar Generating Function?</a:t>
-            </a:r>
-            <a:endParaRPr lang="en-US" dirty="0"/>
-          </a:p>
-        </p:txBody>
-      </p:sp>
-      <p:sp>
-        <p:nvSpPr>
           <p:cNvPr id="3" name="Slide Number Placeholder 2"/>
           <p:cNvSpPr>
             <a:spLocks noGrp="1"/>
@@ -4305,7 +4876,7 @@
           <a:graphicData uri="http://schemas.openxmlformats.org/presentationml/2006/ole">
             <mc:AlternateContent xmlns:mc="http://schemas.openxmlformats.org/markup-compatibility/2006">
               <mc:Choice xmlns:v="urn:schemas-microsoft-com:vml" Requires="v">
-                <p:oleObj spid="_x0000_s236611" name="Equation" r:id="rId4" imgW="3009600" imgH="596880" progId="Equation.DSMT4">
+                <p:oleObj spid="_x0000_s236621" name="Equation" r:id="rId4" imgW="3009600" imgH="596880" progId="Equation.DSMT4">
                   <p:embed/>
                 </p:oleObj>
               </mc:Choice>
@@ -4375,7 +4946,7 @@
           <a:graphicData uri="http://schemas.openxmlformats.org/presentationml/2006/ole">
             <mc:AlternateContent xmlns:mc="http://schemas.openxmlformats.org/markup-compatibility/2006">
               <mc:Choice xmlns:v="urn:schemas-microsoft-com:vml" Requires="v">
-                <p:oleObj spid="_x0000_s236612" name="Equation" r:id="rId6" imgW="2184120" imgH="1269720" progId="Equation.DSMT4">
+                <p:oleObj spid="_x0000_s236622" name="Equation" r:id="rId6" imgW="2184120" imgH="1269720" progId="Equation.DSMT4">
                   <p:embed/>
                 </p:oleObj>
               </mc:Choice>
@@ -4451,7 +5022,7 @@
           <a:graphicData uri="http://schemas.openxmlformats.org/presentationml/2006/ole">
             <mc:AlternateContent xmlns:mc="http://schemas.openxmlformats.org/markup-compatibility/2006">
               <mc:Choice xmlns:v="urn:schemas-microsoft-com:vml" Requires="v">
-                <p:oleObj spid="_x0000_s236613" name="Equation" r:id="rId8" imgW="4089400" imgH="1765300" progId="Equation.3">
+                <p:oleObj spid="_x0000_s236623" name="Equation" r:id="rId8" imgW="4089400" imgH="1765300" progId="Equation.3">
                   <p:embed/>
                 </p:oleObj>
               </mc:Choice>
@@ -4524,11 +5095,50 @@
           </a:graphicData>
         </a:graphic>
       </p:graphicFrame>
+      <p:sp>
+        <p:nvSpPr>
+          <p:cNvPr id="9" name="Title 1"/>
+          <p:cNvSpPr>
+            <a:spLocks noGrp="1"/>
+          </p:cNvSpPr>
+          <p:nvPr>
+            <p:ph type="title"/>
+          </p:nvPr>
+        </p:nvSpPr>
+        <p:spPr>
+          <a:xfrm>
+            <a:off x="1600200" y="228600"/>
+            <a:ext cx="7543800" cy="1143000"/>
+          </a:xfrm>
+        </p:spPr>
+        <p:txBody>
+          <a:bodyPr/>
+          <a:lstStyle/>
+          <a:p>
+            <a:r>
+              <a:rPr lang="en-US" dirty="0" smtClean="0"/>
+              <a:t>Donut </a:t>
+            </a:r>
+            <a:r>
+              <a:rPr lang="en-US" dirty="0" smtClean="0"/>
+              <a:t>Generating </a:t>
+            </a:r>
+            <a:r>
+              <a:rPr lang="en-US" dirty="0" smtClean="0"/>
+              <a:t>Function</a:t>
+            </a:r>
+            <a:endParaRPr lang="en-US" dirty="0"/>
+          </a:p>
+        </p:txBody>
+      </p:sp>
     </p:spTree>
   </p:cSld>
   <p:clrMapOvr>
     <a:masterClrMapping/>
   </p:clrMapOvr>
+  <p:transition xmlns:p14="http://schemas.microsoft.com/office/powerpoint/2010/main" spd="slow" advClick="0">
+    <p:fade/>
+  </p:transition>
   <p:timing>
     <p:tnLst>
       <p:par>
@@ -4734,34 +5344,6 @@
       </p:grpSpPr>
       <p:sp>
         <p:nvSpPr>
-          <p:cNvPr id="2" name="Title 1"/>
-          <p:cNvSpPr>
-            <a:spLocks noGrp="1"/>
-          </p:cNvSpPr>
-          <p:nvPr>
-            <p:ph type="title"/>
-          </p:nvPr>
-        </p:nvSpPr>
-        <p:spPr>
-          <a:xfrm>
-            <a:off x="1600200" y="228600"/>
-            <a:ext cx="7543800" cy="1143000"/>
-          </a:xfrm>
-        </p:spPr>
-        <p:txBody>
-          <a:bodyPr/>
-          <a:lstStyle/>
-          <a:p>
-            <a:r>
-              <a:rPr lang="en-US" dirty="0" smtClean="0"/>
-              <a:t>A Familiar Generating Function?</a:t>
-            </a:r>
-            <a:endParaRPr lang="en-US" dirty="0"/>
-          </a:p>
-        </p:txBody>
-      </p:sp>
-      <p:sp>
-        <p:nvSpPr>
           <p:cNvPr id="3" name="Slide Number Placeholder 2"/>
           <p:cNvSpPr>
             <a:spLocks noGrp="1"/>
@@ -4875,7 +5457,7 @@
           <a:graphicData uri="http://schemas.openxmlformats.org/presentationml/2006/ole">
             <mc:AlternateContent xmlns:mc="http://schemas.openxmlformats.org/markup-compatibility/2006">
               <mc:Choice xmlns:v="urn:schemas-microsoft-com:vml" Requires="v">
-                <p:oleObj spid="_x0000_s253984" name="Equation" r:id="rId4" imgW="2184120" imgH="1523880" progId="Equation.DSMT4">
+                <p:oleObj spid="_x0000_s253988" name="Equation" r:id="rId4" imgW="2184120" imgH="1523880" progId="Equation.DSMT4">
                   <p:embed/>
                 </p:oleObj>
               </mc:Choice>
@@ -4929,23 +5511,50 @@
           </a:graphicData>
         </a:graphic>
       </p:graphicFrame>
+      <p:sp>
+        <p:nvSpPr>
+          <p:cNvPr id="8" name="Title 1"/>
+          <p:cNvSpPr>
+            <a:spLocks noGrp="1"/>
+          </p:cNvSpPr>
+          <p:nvPr>
+            <p:ph type="title"/>
+          </p:nvPr>
+        </p:nvSpPr>
+        <p:spPr>
+          <a:xfrm>
+            <a:off x="1600200" y="228600"/>
+            <a:ext cx="7543800" cy="1143000"/>
+          </a:xfrm>
+        </p:spPr>
+        <p:txBody>
+          <a:bodyPr/>
+          <a:lstStyle/>
+          <a:p>
+            <a:r>
+              <a:rPr lang="en-US" dirty="0" smtClean="0"/>
+              <a:t>Donut </a:t>
+            </a:r>
+            <a:r>
+              <a:rPr lang="en-US" dirty="0" smtClean="0"/>
+              <a:t>Generating </a:t>
+            </a:r>
+            <a:r>
+              <a:rPr lang="en-US" dirty="0" smtClean="0"/>
+              <a:t>Function</a:t>
+            </a:r>
+            <a:endParaRPr lang="en-US" dirty="0"/>
+          </a:p>
+        </p:txBody>
+      </p:sp>
     </p:spTree>
   </p:cSld>
   <p:clrMapOvr>
     <a:masterClrMapping/>
   </p:clrMapOvr>
-  <mc:AlternateContent xmlns:mc="http://schemas.openxmlformats.org/markup-compatibility/2006" xmlns:p14="http://schemas.microsoft.com/office/powerpoint/2010/main">
-    <mc:Choice Requires="p14">
-      <p:transition spd="med" p14:dur="700">
-        <p:fade/>
-      </p:transition>
-    </mc:Choice>
-    <mc:Fallback xmlns="">
-      <p:transition xmlns:p14="http://schemas.microsoft.com/office/powerpoint/2010/main" spd="med">
-        <p:fade/>
-      </p:transition>
-    </mc:Fallback>
-  </mc:AlternateContent>
+  <p:transition xmlns:p14="http://schemas.microsoft.com/office/powerpoint/2010/main" spd="slow" advClick="0">
+    <p:fade/>
+  </p:transition>
   <p:timing>
     <p:tnLst>
       <p:par>
@@ -5199,7 +5808,7 @@
   <p:clrMapOvr>
     <a:masterClrMapping/>
   </p:clrMapOvr>
-  <p:transition xmlns:p14="http://schemas.microsoft.com/office/powerpoint/2010/main">
+  <p:transition xmlns:p14="http://schemas.microsoft.com/office/powerpoint/2010/main" spd="slow" advClick="0">
     <p:fade/>
   </p:transition>
   <p:timing>
@@ -5485,7 +6094,7 @@
           <a:graphicData uri="http://schemas.openxmlformats.org/presentationml/2006/ole">
             <mc:AlternateContent xmlns:mc="http://schemas.openxmlformats.org/markup-compatibility/2006">
               <mc:Choice xmlns:v="urn:schemas-microsoft-com:vml" Requires="v">
-                <p:oleObj spid="_x0000_s256030" name="Equation" r:id="rId4" imgW="2476500" imgH="1600200" progId="Equation.DSMT4">
+                <p:oleObj spid="_x0000_s256034" name="Equation" r:id="rId4" imgW="2476500" imgH="1600200" progId="Equation.DSMT4">
                   <p:embed/>
                 </p:oleObj>
               </mc:Choice>
@@ -5544,7 +6153,7 @@
   <p:clrMapOvr>
     <a:masterClrMapping/>
   </p:clrMapOvr>
-  <p:transition xmlns:p14="http://schemas.microsoft.com/office/powerpoint/2010/main" spd="slow">
+  <p:transition xmlns:p14="http://schemas.microsoft.com/office/powerpoint/2010/main" spd="slow" advClick="0">
     <p:fade/>
   </p:transition>
   <p:timing>
@@ -5730,7 +6339,7 @@
           <a:graphicData uri="http://schemas.openxmlformats.org/presentationml/2006/ole">
             <mc:AlternateContent xmlns:mc="http://schemas.openxmlformats.org/markup-compatibility/2006">
               <mc:Choice xmlns:v="urn:schemas-microsoft-com:vml" Requires="v">
-                <p:oleObj spid="_x0000_s255024" name="Equation" r:id="rId4" imgW="2476500" imgH="1600200" progId="Equation.DSMT4">
+                <p:oleObj spid="_x0000_s255031" name="Equation" r:id="rId4" imgW="2476500" imgH="1600200" progId="Equation.DSMT4">
                   <p:embed/>
                 </p:oleObj>
               </mc:Choice>
@@ -5882,7 +6491,7 @@
           <a:graphicData uri="http://schemas.openxmlformats.org/presentationml/2006/ole">
             <mc:AlternateContent xmlns:mc="http://schemas.openxmlformats.org/markup-compatibility/2006">
               <mc:Choice xmlns:v="urn:schemas-microsoft-com:vml" Requires="v">
-                <p:oleObj spid="_x0000_s255025" name="Equation" r:id="rId6" imgW="2311200" imgH="1523880" progId="Equation.DSMT4">
+                <p:oleObj spid="_x0000_s255032" name="Equation" r:id="rId6" imgW="2311200" imgH="1523880" progId="Equation.DSMT4">
                   <p:embed/>
                 </p:oleObj>
               </mc:Choice>
@@ -5941,7 +6550,7 @@
   <p:clrMapOvr>
     <a:masterClrMapping/>
   </p:clrMapOvr>
-  <p:transition xmlns:p14="http://schemas.microsoft.com/office/powerpoint/2010/main">
+  <p:transition xmlns:p14="http://schemas.microsoft.com/office/powerpoint/2010/main" spd="slow" advClick="0">
     <p:fade/>
   </p:transition>
   <p:timing>
@@ -6048,7 +6657,7 @@
           <a:graphicData uri="http://schemas.openxmlformats.org/presentationml/2006/ole">
             <mc:AlternateContent xmlns:mc="http://schemas.openxmlformats.org/markup-compatibility/2006">
               <mc:Choice xmlns:v="urn:schemas-microsoft-com:vml" Requires="v">
-                <p:oleObj spid="_x0000_s258051" name="Equation" r:id="rId4" imgW="2476500" imgH="1600200" progId="Equation.DSMT4">
+                <p:oleObj spid="_x0000_s258058" name="Equation" r:id="rId4" imgW="2476500" imgH="1600200" progId="Equation.DSMT4">
                   <p:embed/>
                 </p:oleObj>
               </mc:Choice>
@@ -6124,7 +6733,7 @@
           <a:graphicData uri="http://schemas.openxmlformats.org/presentationml/2006/ole">
             <mc:AlternateContent xmlns:mc="http://schemas.openxmlformats.org/markup-compatibility/2006">
               <mc:Choice xmlns:v="urn:schemas-microsoft-com:vml" Requires="v">
-                <p:oleObj spid="_x0000_s258052" name="Equation" r:id="rId6" imgW="3251200" imgH="1663700" progId="Equation.DSMT4">
+                <p:oleObj spid="_x0000_s258059" name="Equation" r:id="rId6" imgW="3251200" imgH="1663700" progId="Equation.DSMT4">
                   <p:embed/>
                 </p:oleObj>
               </mc:Choice>
@@ -6174,7 +6783,7 @@
   <p:clrMapOvr>
     <a:masterClrMapping/>
   </p:clrMapOvr>
-  <p:transition xmlns:p14="http://schemas.microsoft.com/office/powerpoint/2010/main">
+  <p:transition xmlns:p14="http://schemas.microsoft.com/office/powerpoint/2010/main" spd="slow" advClick="0">
     <p:fade/>
   </p:transition>
   <p:timing>
@@ -6226,7 +6835,15 @@
           <a:p>
             <a:r>
               <a:rPr lang="en-US" dirty="0" smtClean="0"/>
-              <a:t>Conclusion: Bags of Fruit</a:t>
+              <a:t>Bags </a:t>
+            </a:r>
+            <a:r>
+              <a:rPr lang="en-US" dirty="0" smtClean="0"/>
+              <a:t>of </a:t>
+            </a:r>
+            <a:r>
+              <a:rPr lang="en-US" dirty="0" smtClean="0"/>
+              <a:t>Fruit Again</a:t>
             </a:r>
             <a:endParaRPr lang="en-US" dirty="0"/>
           </a:p>
@@ -6320,20 +6937,20 @@
           <p:nvPr>
             <p:extLst>
               <p:ext uri="{D42A27DB-BD31-4B8C-83A1-F6EECF244321}">
-                <p14:modId xmlns:p14="http://schemas.microsoft.com/office/powerpoint/2010/main" val="4011583981"/>
+                <p14:modId xmlns:p14="http://schemas.microsoft.com/office/powerpoint/2010/main" val="1615615034"/>
               </p:ext>
             </p:extLst>
           </p:nvPr>
         </p:nvGraphicFramePr>
         <p:xfrm>
-          <a:off x="1873250" y="2673350"/>
+          <a:off x="2781300" y="2374900"/>
           <a:ext cx="3543300" cy="1663700"/>
         </p:xfrm>
         <a:graphic>
           <a:graphicData uri="http://schemas.openxmlformats.org/presentationml/2006/ole">
             <mc:AlternateContent xmlns:mc="http://schemas.openxmlformats.org/markup-compatibility/2006">
               <mc:Choice xmlns:v="urn:schemas-microsoft-com:vml" Requires="v">
-                <p:oleObj spid="_x0000_s93255" name="Equation" r:id="rId4" imgW="3543300" imgH="1663700" progId="Equation.DSMT4">
+                <p:oleObj spid="_x0000_s93268" name="Equation" r:id="rId4" imgW="3543300" imgH="1663700" progId="Equation.DSMT4">
                   <p:embed/>
                 </p:oleObj>
               </mc:Choice>
@@ -6357,7 +6974,7 @@
                     </p:blipFill>
                     <p:spPr bwMode="auto">
                       <a:xfrm>
-                        <a:off x="1873250" y="2673350"/>
+                        <a:off x="2781300" y="2374900"/>
                         <a:ext cx="3543300" cy="1663700"/>
                       </a:xfrm>
                       <a:prstGeom prst="rect">
@@ -6390,20 +7007,20 @@
           <p:nvPr>
             <p:extLst>
               <p:ext uri="{D42A27DB-BD31-4B8C-83A1-F6EECF244321}">
-                <p14:modId xmlns:p14="http://schemas.microsoft.com/office/powerpoint/2010/main" val="4019217204"/>
+                <p14:modId xmlns:p14="http://schemas.microsoft.com/office/powerpoint/2010/main" val="2245061878"/>
               </p:ext>
             </p:extLst>
           </p:nvPr>
         </p:nvGraphicFramePr>
         <p:xfrm>
-          <a:off x="901700" y="4495800"/>
+          <a:off x="901700" y="4191000"/>
           <a:ext cx="5270500" cy="1574800"/>
         </p:xfrm>
         <a:graphic>
           <a:graphicData uri="http://schemas.openxmlformats.org/presentationml/2006/ole">
             <mc:AlternateContent xmlns:mc="http://schemas.openxmlformats.org/markup-compatibility/2006">
               <mc:Choice xmlns:v="urn:schemas-microsoft-com:vml" Requires="v">
-                <p:oleObj spid="_x0000_s93256" name="Equation" r:id="rId6" imgW="5270500" imgH="1574800" progId="Equation.DSMT4">
+                <p:oleObj spid="_x0000_s93269" name="Equation" r:id="rId6" imgW="5270500" imgH="1574800" progId="Equation.DSMT4">
                   <p:embed/>
                 </p:oleObj>
               </mc:Choice>
@@ -6427,7 +7044,7 @@
                     </p:blipFill>
                     <p:spPr bwMode="auto">
                       <a:xfrm>
-                        <a:off x="901700" y="4495800"/>
+                        <a:off x="901700" y="4191000"/>
                         <a:ext cx="5270500" cy="1574800"/>
                       </a:xfrm>
                       <a:prstGeom prst="rect">
@@ -6460,20 +7077,20 @@
           <p:nvPr>
             <p:extLst>
               <p:ext uri="{D42A27DB-BD31-4B8C-83A1-F6EECF244321}">
-                <p14:modId xmlns:p14="http://schemas.microsoft.com/office/powerpoint/2010/main" val="125849754"/>
+                <p14:modId xmlns:p14="http://schemas.microsoft.com/office/powerpoint/2010/main" val="628064151"/>
               </p:ext>
             </p:extLst>
           </p:nvPr>
         </p:nvGraphicFramePr>
         <p:xfrm>
-          <a:off x="6484938" y="4899025"/>
+          <a:off x="6484938" y="4648200"/>
           <a:ext cx="1838325" cy="587375"/>
         </p:xfrm>
         <a:graphic>
           <a:graphicData uri="http://schemas.openxmlformats.org/presentationml/2006/ole">
             <mc:AlternateContent xmlns:mc="http://schemas.openxmlformats.org/markup-compatibility/2006">
               <mc:Choice xmlns:v="urn:schemas-microsoft-com:vml" Requires="v">
-                <p:oleObj spid="_x0000_s93257" name="Equation" r:id="rId8" imgW="1511300" imgH="482600" progId="Equation.DSMT4">
+                <p:oleObj spid="_x0000_s93270" name="Equation" r:id="rId8" imgW="1511300" imgH="482600" progId="Equation.DSMT4">
                   <p:embed/>
                 </p:oleObj>
               </mc:Choice>
@@ -6497,7 +7114,7 @@
                     </p:blipFill>
                     <p:spPr bwMode="auto">
                       <a:xfrm>
-                        <a:off x="6484938" y="4899025"/>
+                        <a:off x="6484938" y="4648200"/>
                         <a:ext cx="1838325" cy="587375"/>
                       </a:xfrm>
                       <a:prstGeom prst="rect">
@@ -6513,23 +7130,44 @@
           </a:graphicData>
         </a:graphic>
       </p:graphicFrame>
+      <p:sp>
+        <p:nvSpPr>
+          <p:cNvPr id="4" name="TextBox 3"/>
+          <p:cNvSpPr txBox="1"/>
+          <p:nvPr/>
+        </p:nvSpPr>
+        <p:spPr>
+          <a:xfrm>
+            <a:off x="6248400" y="5410200"/>
+            <a:ext cx="2724374" cy="769441"/>
+          </a:xfrm>
+          <a:prstGeom prst="rect">
+            <a:avLst/>
+          </a:prstGeom>
+          <a:noFill/>
+        </p:spPr>
+        <p:txBody>
+          <a:bodyPr wrap="none" rtlCol="0">
+            <a:spAutoFit/>
+          </a:bodyPr>
+          <a:lstStyle/>
+          <a:p>
+            <a:r>
+              <a:rPr lang="en-US" dirty="0" smtClean="0"/>
+              <a:t>as before</a:t>
+            </a:r>
+            <a:endParaRPr lang="en-US" dirty="0"/>
+          </a:p>
+        </p:txBody>
+      </p:sp>
     </p:spTree>
   </p:cSld>
   <p:clrMapOvr>
     <a:masterClrMapping/>
   </p:clrMapOvr>
-  <mc:AlternateContent xmlns:mc="http://schemas.openxmlformats.org/markup-compatibility/2006" xmlns:p14="http://schemas.microsoft.com/office/powerpoint/2010/main">
-    <mc:Choice Requires="p14">
-      <p:transition spd="med" p14:dur="700">
-        <p:fade/>
-      </p:transition>
-    </mc:Choice>
-    <mc:Fallback xmlns="">
-      <p:transition xmlns:p14="http://schemas.microsoft.com/office/powerpoint/2010/main" spd="med">
-        <p:fade/>
-      </p:transition>
-    </mc:Fallback>
-  </mc:AlternateContent>
+  <p:transition xmlns:p14="http://schemas.microsoft.com/office/powerpoint/2010/main" spd="slow" advClick="0">
+    <p:fade/>
+  </p:transition>
   <p:timing>
     <p:tnLst>
       <p:par>
@@ -6551,7 +7189,7 @@
                             </p:stCondLst>
                             <p:childTnLst>
                               <p:par>
-                                <p:cTn id="5" presetID="1" presetClass="entr" presetSubtype="0" fill="hold" nodeType="clickEffect">
+                                <p:cTn id="5" presetID="10" presetClass="entr" presetSubtype="0" fill="hold" nodeType="clickEffect">
                                   <p:stCondLst>
                                     <p:cond delay="0"/>
                                   </p:stCondLst>
@@ -6574,6 +7212,14 @@
                                         <p:strVal val="visible"/>
                                       </p:to>
                                     </p:set>
+                                    <p:animEffect transition="in" filter="fade">
+                                      <p:cBhvr>
+                                        <p:cTn id="7" dur="500"/>
+                                        <p:tgtEl>
+                                          <p:spTgt spid="93189"/>
+                                        </p:tgtEl>
+                                      </p:cBhvr>
+                                    </p:animEffect>
                                   </p:childTnLst>
                                 </p:cTn>
                               </p:par>
@@ -6584,26 +7230,26 @@
                     </p:cTn>
                   </p:par>
                   <p:par>
-                    <p:cTn id="7" fill="hold">
+                    <p:cTn id="8" fill="hold">
                       <p:stCondLst>
                         <p:cond delay="indefinite"/>
                       </p:stCondLst>
                       <p:childTnLst>
                         <p:par>
-                          <p:cTn id="8" fill="hold">
+                          <p:cTn id="9" fill="hold">
                             <p:stCondLst>
                               <p:cond delay="0"/>
                             </p:stCondLst>
                             <p:childTnLst>
                               <p:par>
-                                <p:cTn id="9" presetID="22" presetClass="entr" presetSubtype="8" fill="hold" nodeType="clickEffect">
+                                <p:cTn id="10" presetID="22" presetClass="entr" presetSubtype="8" fill="hold" nodeType="clickEffect">
                                   <p:stCondLst>
                                     <p:cond delay="0"/>
                                   </p:stCondLst>
                                   <p:childTnLst>
                                     <p:set>
                                       <p:cBhvr>
-                                        <p:cTn id="10" dur="1" fill="hold">
+                                        <p:cTn id="11" dur="1" fill="hold">
                                           <p:stCondLst>
                                             <p:cond delay="0"/>
                                           </p:stCondLst>
@@ -6621,7 +7267,7 @@
                                     </p:set>
                                     <p:animEffect transition="in" filter="wipe(left)">
                                       <p:cBhvr>
-                                        <p:cTn id="11" dur="500"/>
+                                        <p:cTn id="12" dur="500"/>
                                         <p:tgtEl>
                                           <p:spTgt spid="10"/>
                                         </p:tgtEl>
@@ -6634,20 +7280,20 @@
                           </p:cTn>
                         </p:par>
                         <p:par>
-                          <p:cTn id="12" fill="hold">
+                          <p:cTn id="13" fill="hold">
                             <p:stCondLst>
                               <p:cond delay="500"/>
                             </p:stCondLst>
                             <p:childTnLst>
                               <p:par>
-                                <p:cTn id="13" presetID="22" presetClass="entr" presetSubtype="8" fill="hold" nodeType="afterEffect">
+                                <p:cTn id="14" presetID="22" presetClass="entr" presetSubtype="8" fill="hold" nodeType="afterEffect">
                                   <p:stCondLst>
                                     <p:cond delay="0"/>
                                   </p:stCondLst>
                                   <p:childTnLst>
                                     <p:set>
                                       <p:cBhvr>
-                                        <p:cTn id="14" dur="1" fill="hold">
+                                        <p:cTn id="15" dur="1" fill="hold">
                                           <p:stCondLst>
                                             <p:cond delay="0"/>
                                           </p:stCondLst>
@@ -6665,9 +7311,62 @@
                                     </p:set>
                                     <p:animEffect transition="in" filter="wipe(left)">
                                       <p:cBhvr>
-                                        <p:cTn id="15" dur="500"/>
+                                        <p:cTn id="16" dur="500"/>
                                         <p:tgtEl>
                                           <p:spTgt spid="11"/>
+                                        </p:tgtEl>
+                                      </p:cBhvr>
+                                    </p:animEffect>
+                                  </p:childTnLst>
+                                </p:cTn>
+                              </p:par>
+                            </p:childTnLst>
+                          </p:cTn>
+                        </p:par>
+                      </p:childTnLst>
+                    </p:cTn>
+                  </p:par>
+                  <p:par>
+                    <p:cTn id="17" fill="hold">
+                      <p:stCondLst>
+                        <p:cond delay="indefinite"/>
+                      </p:stCondLst>
+                      <p:childTnLst>
+                        <p:par>
+                          <p:cTn id="18" fill="hold">
+                            <p:stCondLst>
+                              <p:cond delay="0"/>
+                            </p:stCondLst>
+                            <p:childTnLst>
+                              <p:par>
+                                <p:cTn id="19" presetID="10" presetClass="entr" presetSubtype="0" fill="hold" grpId="0" nodeType="clickEffect">
+                                  <p:stCondLst>
+                                    <p:cond delay="0"/>
+                                  </p:stCondLst>
+                                  <p:childTnLst>
+                                    <p:set>
+                                      <p:cBhvr>
+                                        <p:cTn id="20" dur="1" fill="hold">
+                                          <p:stCondLst>
+                                            <p:cond delay="0"/>
+                                          </p:stCondLst>
+                                        </p:cTn>
+                                        <p:tgtEl>
+                                          <p:spTgt spid="4"/>
+                                        </p:tgtEl>
+                                        <p:attrNameLst>
+                                          <p:attrName>style.visibility</p:attrName>
+                                        </p:attrNameLst>
+                                      </p:cBhvr>
+                                      <p:to>
+                                        <p:strVal val="visible"/>
+                                      </p:to>
+                                    </p:set>
+                                    <p:animEffect transition="in" filter="fade">
+                                      <p:cBhvr>
+                                        <p:cTn id="21" dur="500"/>
+                                        <p:tgtEl>
+                                          <p:spTgt spid="4"/>
                                         </p:tgtEl>
                                       </p:cBhvr>
                                     </p:animEffect>
@@ -6701,6 +7400,9 @@
         </p:cTn>
       </p:par>
     </p:tnLst>
+    <p:bldLst>
+      <p:bldP spid="4" grpId="0"/>
+    </p:bldLst>
   </p:timing>
 </p:sld>
 </file>

</xml_diff>

<commit_message>
edits genfunccount, genfunccoefficient, partial-fractions.pptx
</commit_message>
<xml_diff>
--- a/spring13/slides13/genfunccoefficient.pptx
+++ b/spring13/slides13/genfunccoefficient.pptx
@@ -3434,15 +3434,7 @@
                   <a:schemeClr val="tx2"/>
                 </a:solidFill>
               </a:rPr>
-              <a:t>by </a:t>
-            </a:r>
-            <a:r>
-              <a:rPr lang="en-US" sz="6000" b="1" dirty="0" smtClean="0">
-                <a:solidFill>
-                  <a:schemeClr val="tx2"/>
-                </a:solidFill>
-              </a:rPr>
-              <a:t>Counting</a:t>
+              <a:t>by Counting</a:t>
             </a:r>
             <a:endParaRPr lang="en-US" sz="1200" b="1" dirty="0">
               <a:solidFill>
@@ -3457,11 +3449,11 @@
   <p:clrMapOvr>
     <a:masterClrMapping/>
   </p:clrMapOvr>
-  <mc:AlternateContent xmlns:mc="http://schemas.openxmlformats.org/markup-compatibility/2006">
-    <mc:Choice xmlns:p14="http://schemas.microsoft.com/office/powerpoint/2010/main" Requires="p14">
+  <mc:AlternateContent xmlns:mc="http://schemas.openxmlformats.org/markup-compatibility/2006" xmlns:p14="http://schemas.microsoft.com/office/powerpoint/2010/main">
+    <mc:Choice Requires="p14">
       <p:transition p14:dur="0" advClick="0"/>
     </mc:Choice>
-    <mc:Fallback>
+    <mc:Fallback xmlns="">
       <p:transition xmlns:p14="http://schemas.microsoft.com/office/powerpoint/2010/main" advClick="0"/>
     </mc:Fallback>
   </mc:AlternateContent>
@@ -3659,7 +3651,7 @@
           <a:graphicData uri="http://schemas.openxmlformats.org/presentationml/2006/ole">
             <mc:AlternateContent xmlns:mc="http://schemas.openxmlformats.org/markup-compatibility/2006">
               <mc:Choice xmlns:v="urn:schemas-microsoft-com:vml" Requires="v">
-                <p:oleObj spid="_x0000_s1074" name="Equation" r:id="rId4" imgW="3073400" imgH="1574800" progId="Equation.DSMT4">
+                <p:oleObj spid="_x0000_s1079" name="Equation" r:id="rId4" imgW="3073400" imgH="1574800" progId="Equation.DSMT4">
                   <p:embed/>
                 </p:oleObj>
               </mc:Choice>
@@ -3799,7 +3791,7 @@
           <a:graphicData uri="http://schemas.openxmlformats.org/presentationml/2006/ole">
             <mc:AlternateContent xmlns:mc="http://schemas.openxmlformats.org/markup-compatibility/2006">
               <mc:Choice xmlns:v="urn:schemas-microsoft-com:vml" Requires="v">
-                <p:oleObj spid="_x0000_s1075" name="Equation" r:id="rId6" imgW="2857500" imgH="1663700" progId="Equation.DSMT4">
+                <p:oleObj spid="_x0000_s1080" name="Equation" r:id="rId6" imgW="2857500" imgH="1663700" progId="Equation.DSMT4">
                   <p:embed/>
                 </p:oleObj>
               </mc:Choice>
@@ -4046,7 +4038,7 @@
           <a:graphicData uri="http://schemas.openxmlformats.org/presentationml/2006/ole">
             <mc:AlternateContent xmlns:mc="http://schemas.openxmlformats.org/markup-compatibility/2006">
               <mc:Choice xmlns:v="urn:schemas-microsoft-com:vml" Requires="v">
-                <p:oleObj spid="_x0000_s259079" name="Equation" r:id="rId4" imgW="3708400" imgH="1574800" progId="Equation.DSMT4">
+                <p:oleObj spid="_x0000_s259084" name="Equation" r:id="rId4" imgW="3708400" imgH="1574800" progId="Equation.DSMT4">
                   <p:embed/>
                 </p:oleObj>
               </mc:Choice>
@@ -4108,7 +4100,7 @@
           <a:graphicData uri="http://schemas.openxmlformats.org/presentationml/2006/ole">
             <mc:AlternateContent xmlns:mc="http://schemas.openxmlformats.org/markup-compatibility/2006">
               <mc:Choice xmlns:v="urn:schemas-microsoft-com:vml" Requires="v">
-                <p:oleObj spid="_x0000_s259080" name="Equation" r:id="rId6" imgW="3416300" imgH="1638300" progId="Equation.DSMT4">
+                <p:oleObj spid="_x0000_s259085" name="Equation" r:id="rId6" imgW="3416300" imgH="1638300" progId="Equation.DSMT4">
                   <p:embed/>
                 </p:oleObj>
               </mc:Choice>
@@ -4356,15 +4348,7 @@
           <a:p>
             <a:r>
               <a:rPr lang="en-US" dirty="0" smtClean="0"/>
-              <a:t>Donut </a:t>
-            </a:r>
-            <a:r>
-              <a:rPr lang="en-US" dirty="0" smtClean="0"/>
-              <a:t>Generating </a:t>
-            </a:r>
-            <a:r>
-              <a:rPr lang="en-US" dirty="0" smtClean="0"/>
-              <a:t>Function</a:t>
+              <a:t>Donut Generating Function</a:t>
             </a:r>
             <a:endParaRPr lang="en-US" dirty="0"/>
           </a:p>
@@ -4473,7 +4457,7 @@
           <a:graphicData uri="http://schemas.openxmlformats.org/presentationml/2006/ole">
             <mc:AlternateContent xmlns:mc="http://schemas.openxmlformats.org/markup-compatibility/2006">
               <mc:Choice xmlns:v="urn:schemas-microsoft-com:vml" Requires="v">
-                <p:oleObj spid="_x0000_s235576" name="Equation" r:id="rId4" imgW="3429000" imgH="1244520" progId="Equation.DSMT4">
+                <p:oleObj spid="_x0000_s235581" name="Equation" r:id="rId4" imgW="3429000" imgH="1244520" progId="Equation.DSMT4">
                   <p:embed/>
                 </p:oleObj>
               </mc:Choice>
@@ -4543,7 +4527,7 @@
           <a:graphicData uri="http://schemas.openxmlformats.org/presentationml/2006/ole">
             <mc:AlternateContent xmlns:mc="http://schemas.openxmlformats.org/markup-compatibility/2006">
               <mc:Choice xmlns:v="urn:schemas-microsoft-com:vml" Requires="v">
-                <p:oleObj spid="_x0000_s235577" name="Equation" r:id="rId6" imgW="3429000" imgH="1244520" progId="Equation.DSMT4">
+                <p:oleObj spid="_x0000_s235582" name="Equation" r:id="rId6" imgW="3429000" imgH="1244520" progId="Equation.DSMT4">
                   <p:embed/>
                 </p:oleObj>
               </mc:Choice>
@@ -4876,7 +4860,7 @@
           <a:graphicData uri="http://schemas.openxmlformats.org/presentationml/2006/ole">
             <mc:AlternateContent xmlns:mc="http://schemas.openxmlformats.org/markup-compatibility/2006">
               <mc:Choice xmlns:v="urn:schemas-microsoft-com:vml" Requires="v">
-                <p:oleObj spid="_x0000_s236621" name="Equation" r:id="rId4" imgW="3009600" imgH="596880" progId="Equation.DSMT4">
+                <p:oleObj spid="_x0000_s236628" name="Equation" r:id="rId4" imgW="3009600" imgH="596880" progId="Equation.DSMT4">
                   <p:embed/>
                 </p:oleObj>
               </mc:Choice>
@@ -4946,7 +4930,7 @@
           <a:graphicData uri="http://schemas.openxmlformats.org/presentationml/2006/ole">
             <mc:AlternateContent xmlns:mc="http://schemas.openxmlformats.org/markup-compatibility/2006">
               <mc:Choice xmlns:v="urn:schemas-microsoft-com:vml" Requires="v">
-                <p:oleObj spid="_x0000_s236622" name="Equation" r:id="rId6" imgW="2184120" imgH="1269720" progId="Equation.DSMT4">
+                <p:oleObj spid="_x0000_s236629" name="Equation" r:id="rId6" imgW="2184120" imgH="1269720" progId="Equation.DSMT4">
                   <p:embed/>
                 </p:oleObj>
               </mc:Choice>
@@ -5022,7 +5006,7 @@
           <a:graphicData uri="http://schemas.openxmlformats.org/presentationml/2006/ole">
             <mc:AlternateContent xmlns:mc="http://schemas.openxmlformats.org/markup-compatibility/2006">
               <mc:Choice xmlns:v="urn:schemas-microsoft-com:vml" Requires="v">
-                <p:oleObj spid="_x0000_s236623" name="Equation" r:id="rId8" imgW="4089400" imgH="1765300" progId="Equation.3">
+                <p:oleObj spid="_x0000_s236630" name="Equation" r:id="rId8" imgW="4089400" imgH="1765300" progId="Equation.3">
                   <p:embed/>
                 </p:oleObj>
               </mc:Choice>
@@ -5117,15 +5101,7 @@
           <a:p>
             <a:r>
               <a:rPr lang="en-US" dirty="0" smtClean="0"/>
-              <a:t>Donut </a:t>
-            </a:r>
-            <a:r>
-              <a:rPr lang="en-US" dirty="0" smtClean="0"/>
-              <a:t>Generating </a:t>
-            </a:r>
-            <a:r>
-              <a:rPr lang="en-US" dirty="0" smtClean="0"/>
-              <a:t>Function</a:t>
+              <a:t>Donut Generating Function</a:t>
             </a:r>
             <a:endParaRPr lang="en-US" dirty="0"/>
           </a:p>
@@ -5457,7 +5433,7 @@
           <a:graphicData uri="http://schemas.openxmlformats.org/presentationml/2006/ole">
             <mc:AlternateContent xmlns:mc="http://schemas.openxmlformats.org/markup-compatibility/2006">
               <mc:Choice xmlns:v="urn:schemas-microsoft-com:vml" Requires="v">
-                <p:oleObj spid="_x0000_s253988" name="Equation" r:id="rId4" imgW="2184120" imgH="1523880" progId="Equation.DSMT4">
+                <p:oleObj spid="_x0000_s253991" name="Equation" r:id="rId4" imgW="2184120" imgH="1523880" progId="Equation.DSMT4">
                   <p:embed/>
                 </p:oleObj>
               </mc:Choice>
@@ -5533,15 +5509,7 @@
           <a:p>
             <a:r>
               <a:rPr lang="en-US" dirty="0" smtClean="0"/>
-              <a:t>Donut </a:t>
-            </a:r>
-            <a:r>
-              <a:rPr lang="en-US" dirty="0" smtClean="0"/>
-              <a:t>Generating </a:t>
-            </a:r>
-            <a:r>
-              <a:rPr lang="en-US" dirty="0" smtClean="0"/>
-              <a:t>Function</a:t>
+              <a:t>Donut Generating Function</a:t>
             </a:r>
             <a:endParaRPr lang="en-US" dirty="0"/>
           </a:p>
@@ -6094,7 +6062,7 @@
           <a:graphicData uri="http://schemas.openxmlformats.org/presentationml/2006/ole">
             <mc:AlternateContent xmlns:mc="http://schemas.openxmlformats.org/markup-compatibility/2006">
               <mc:Choice xmlns:v="urn:schemas-microsoft-com:vml" Requires="v">
-                <p:oleObj spid="_x0000_s256034" name="Equation" r:id="rId4" imgW="2476500" imgH="1600200" progId="Equation.DSMT4">
+                <p:oleObj spid="_x0000_s256037" name="Equation" r:id="rId4" imgW="2476500" imgH="1600200" progId="Equation.DSMT4">
                   <p:embed/>
                 </p:oleObj>
               </mc:Choice>
@@ -6339,7 +6307,7 @@
           <a:graphicData uri="http://schemas.openxmlformats.org/presentationml/2006/ole">
             <mc:AlternateContent xmlns:mc="http://schemas.openxmlformats.org/markup-compatibility/2006">
               <mc:Choice xmlns:v="urn:schemas-microsoft-com:vml" Requires="v">
-                <p:oleObj spid="_x0000_s255031" name="Equation" r:id="rId4" imgW="2476500" imgH="1600200" progId="Equation.DSMT4">
+                <p:oleObj spid="_x0000_s255036" name="Equation" r:id="rId4" imgW="2476500" imgH="1600200" progId="Equation.DSMT4">
                   <p:embed/>
                 </p:oleObj>
               </mc:Choice>
@@ -6491,7 +6459,7 @@
           <a:graphicData uri="http://schemas.openxmlformats.org/presentationml/2006/ole">
             <mc:AlternateContent xmlns:mc="http://schemas.openxmlformats.org/markup-compatibility/2006">
               <mc:Choice xmlns:v="urn:schemas-microsoft-com:vml" Requires="v">
-                <p:oleObj spid="_x0000_s255032" name="Equation" r:id="rId6" imgW="2311200" imgH="1523880" progId="Equation.DSMT4">
+                <p:oleObj spid="_x0000_s255037" name="Equation" r:id="rId6" imgW="2311200" imgH="1523880" progId="Equation.DSMT4">
                   <p:embed/>
                 </p:oleObj>
               </mc:Choice>
@@ -6657,7 +6625,7 @@
           <a:graphicData uri="http://schemas.openxmlformats.org/presentationml/2006/ole">
             <mc:AlternateContent xmlns:mc="http://schemas.openxmlformats.org/markup-compatibility/2006">
               <mc:Choice xmlns:v="urn:schemas-microsoft-com:vml" Requires="v">
-                <p:oleObj spid="_x0000_s258058" name="Equation" r:id="rId4" imgW="2476500" imgH="1600200" progId="Equation.DSMT4">
+                <p:oleObj spid="_x0000_s258063" name="Equation" r:id="rId4" imgW="2476500" imgH="1600200" progId="Equation.DSMT4">
                   <p:embed/>
                 </p:oleObj>
               </mc:Choice>
@@ -6733,7 +6701,7 @@
           <a:graphicData uri="http://schemas.openxmlformats.org/presentationml/2006/ole">
             <mc:AlternateContent xmlns:mc="http://schemas.openxmlformats.org/markup-compatibility/2006">
               <mc:Choice xmlns:v="urn:schemas-microsoft-com:vml" Requires="v">
-                <p:oleObj spid="_x0000_s258059" name="Equation" r:id="rId6" imgW="3251200" imgH="1663700" progId="Equation.DSMT4">
+                <p:oleObj spid="_x0000_s258064" name="Equation" r:id="rId6" imgW="3251200" imgH="1663700" progId="Equation.DSMT4">
                   <p:embed/>
                 </p:oleObj>
               </mc:Choice>
@@ -6783,7 +6751,7 @@
   <p:clrMapOvr>
     <a:masterClrMapping/>
   </p:clrMapOvr>
-  <p:transition xmlns:p14="http://schemas.microsoft.com/office/powerpoint/2010/main" spd="slow" advClick="0">
+  <p:transition xmlns:p14="http://schemas.microsoft.com/office/powerpoint/2010/main" advClick="0">
     <p:fade/>
   </p:transition>
   <p:timing>
@@ -6835,15 +6803,7 @@
           <a:p>
             <a:r>
               <a:rPr lang="en-US" dirty="0" smtClean="0"/>
-              <a:t>Bags </a:t>
-            </a:r>
-            <a:r>
-              <a:rPr lang="en-US" dirty="0" smtClean="0"/>
-              <a:t>of </a:t>
-            </a:r>
-            <a:r>
-              <a:rPr lang="en-US" dirty="0" smtClean="0"/>
-              <a:t>Fruit Again</a:t>
+              <a:t>Bags of Fruit Again</a:t>
             </a:r>
             <a:endParaRPr lang="en-US" dirty="0"/>
           </a:p>
@@ -6950,7 +6910,7 @@
           <a:graphicData uri="http://schemas.openxmlformats.org/presentationml/2006/ole">
             <mc:AlternateContent xmlns:mc="http://schemas.openxmlformats.org/markup-compatibility/2006">
               <mc:Choice xmlns:v="urn:schemas-microsoft-com:vml" Requires="v">
-                <p:oleObj spid="_x0000_s93268" name="Equation" r:id="rId4" imgW="3543300" imgH="1663700" progId="Equation.DSMT4">
+                <p:oleObj spid="_x0000_s93275" name="Equation" r:id="rId4" imgW="3543300" imgH="1663700" progId="Equation.DSMT4">
                   <p:embed/>
                 </p:oleObj>
               </mc:Choice>
@@ -7020,7 +6980,7 @@
           <a:graphicData uri="http://schemas.openxmlformats.org/presentationml/2006/ole">
             <mc:AlternateContent xmlns:mc="http://schemas.openxmlformats.org/markup-compatibility/2006">
               <mc:Choice xmlns:v="urn:schemas-microsoft-com:vml" Requires="v">
-                <p:oleObj spid="_x0000_s93269" name="Equation" r:id="rId6" imgW="5270500" imgH="1574800" progId="Equation.DSMT4">
+                <p:oleObj spid="_x0000_s93276" name="Equation" r:id="rId6" imgW="5270500" imgH="1574800" progId="Equation.DSMT4">
                   <p:embed/>
                 </p:oleObj>
               </mc:Choice>
@@ -7090,7 +7050,7 @@
           <a:graphicData uri="http://schemas.openxmlformats.org/presentationml/2006/ole">
             <mc:AlternateContent xmlns:mc="http://schemas.openxmlformats.org/markup-compatibility/2006">
               <mc:Choice xmlns:v="urn:schemas-microsoft-com:vml" Requires="v">
-                <p:oleObj spid="_x0000_s93270" name="Equation" r:id="rId8" imgW="1511300" imgH="482600" progId="Equation.DSMT4">
+                <p:oleObj spid="_x0000_s93277" name="Equation" r:id="rId8" imgW="1511300" imgH="482600" progId="Equation.DSMT4">
                   <p:embed/>
                 </p:oleObj>
               </mc:Choice>

</xml_diff>